<commit_message>
Final update to pres
</commit_message>
<xml_diff>
--- a/Documentation/MOCUIPlugin-Demo1.pptx
+++ b/Documentation/MOCUIPlugin-Demo1.pptx
@@ -5,7 +5,7 @@
     <p:sldMasterId id="2147483648" r:id="rId2"/>
   </p:sldMasterIdLst>
   <p:notesMasterIdLst>
-    <p:notesMasterId r:id="rId12"/>
+    <p:notesMasterId r:id="rId11"/>
   </p:notesMasterIdLst>
   <p:sldIdLst>
     <p:sldId id="256" r:id="rId3"/>
@@ -14,9 +14,8 @@
     <p:sldId id="268" r:id="rId6"/>
     <p:sldId id="269" r:id="rId7"/>
     <p:sldId id="270" r:id="rId8"/>
-    <p:sldId id="272" r:id="rId9"/>
-    <p:sldId id="271" r:id="rId10"/>
-    <p:sldId id="265" r:id="rId11"/>
+    <p:sldId id="271" r:id="rId9"/>
+    <p:sldId id="265" r:id="rId10"/>
   </p:sldIdLst>
   <p:sldSz cx="9144000" cy="5143500" type="screen16x9"/>
   <p:notesSz cx="6858000" cy="9144000"/>
@@ -115,7 +114,7 @@
   </p:defaultTextStyle>
   <p:extLst>
     <p:ext uri="{EFAFB233-063F-42B5-8137-9DF3F51BA10A}">
-      <p15:sldGuideLst xmlns:p15="http://schemas.microsoft.com/office/powerpoint/2012/main">
+      <p15:sldGuideLst xmlns:p15="http://schemas.microsoft.com/office/powerpoint/2012/main" xmlns="">
         <p15:guide id="1" orient="horz" pos="1620">
           <p15:clr>
             <a:srgbClr val="A4A3A4"/>
@@ -217,7 +216,7 @@
             <a:fld id="{A8ADFD5B-A66C-449C-B6E8-FB716D07777D}" type="datetimeFigureOut">
               <a:rPr lang="en-US" smtClean="0"/>
               <a:pPr/>
-              <a:t>3/4/2015</a:t>
+              <a:t>3/5/2015</a:t>
             </a:fld>
             <a:endParaRPr lang="en-US"/>
           </a:p>
@@ -857,7 +856,7 @@
                 </a:solidFill>
               </a:rPr>
               <a:pPr algn="ctr"/>
-              <a:t>3/4/2015</a:t>
+              <a:t>3/5/2015</a:t>
             </a:fld>
             <a:endParaRPr kumimoji="0" lang="en-US" sz="2000" dirty="0">
               <a:solidFill>
@@ -1056,7 +1055,7 @@
             <a:fld id="{E4606EA6-EFEA-4C30-9264-4F9291A5780D}" type="datetime1">
               <a:rPr kumimoji="0" lang="en-US" smtClean="0"/>
               <a:pPr/>
-              <a:t>3/4/2015</a:t>
+              <a:t>3/5/2015</a:t>
             </a:fld>
             <a:endParaRPr kumimoji="0" lang="en-US"/>
           </a:p>
@@ -1487,7 +1486,7 @@
             <a:fld id="{6FCF9F07-3BC7-4570-B054-79111B0A380C}" type="datetime1">
               <a:rPr kumimoji="0" lang="en-US" smtClean="0"/>
               <a:pPr/>
-              <a:t>3/4/2015</a:t>
+              <a:t>3/5/2015</a:t>
             </a:fld>
             <a:endParaRPr kumimoji="0" lang="en-US"/>
           </a:p>
@@ -1752,7 +1751,7 @@
             <a:fld id="{E4606EA6-EFEA-4C30-9264-4F9291A5780D}" type="datetime1">
               <a:rPr kumimoji="0" lang="en-US" smtClean="0"/>
               <a:pPr/>
-              <a:t>3/4/2015</a:t>
+              <a:t>3/5/2015</a:t>
             </a:fld>
             <a:endParaRPr kumimoji="0" lang="en-US"/>
           </a:p>
@@ -2007,7 +2006,7 @@
             <a:fld id="{E4606EA6-EFEA-4C30-9264-4F9291A5780D}" type="datetime1">
               <a:rPr kumimoji="0" lang="en-US" smtClean="0"/>
               <a:pPr/>
-              <a:t>3/4/2015</a:t>
+              <a:t>3/5/2015</a:t>
             </a:fld>
             <a:endParaRPr kumimoji="0" lang="en-US"/>
           </a:p>
@@ -2220,7 +2219,7 @@
             <a:fld id="{6DFADB5D-B7A0-47E3-AD2D-B1A6F8614213}" type="datetime1">
               <a:rPr kumimoji="0" lang="en-US" smtClean="0"/>
               <a:pPr/>
-              <a:t>3/4/2015</a:t>
+              <a:t>3/5/2015</a:t>
             </a:fld>
             <a:endParaRPr kumimoji="0" lang="en-US"/>
           </a:p>
@@ -2333,7 +2332,7 @@
             <a:fld id="{72968126-03FC-49C0-B9B8-2B561CCC3D90}" type="datetime1">
               <a:rPr kumimoji="0" lang="en-US" smtClean="0"/>
               <a:pPr/>
-              <a:t>3/4/2015</a:t>
+              <a:t>3/5/2015</a:t>
             </a:fld>
             <a:endParaRPr kumimoji="0" lang="en-US"/>
           </a:p>
@@ -2486,7 +2485,7 @@
             <a:fld id="{F49A8198-4617-485E-9585-4840B69DBBA6}" type="datetime1">
               <a:rPr kumimoji="0" lang="en-US" smtClean="0"/>
               <a:pPr/>
-              <a:t>3/4/2015</a:t>
+              <a:t>3/5/2015</a:t>
             </a:fld>
             <a:endParaRPr kumimoji="0" lang="en-US"/>
           </a:p>
@@ -3075,7 +3074,7 @@
             <a:fld id="{E4606EA6-EFEA-4C30-9264-4F9291A5780D}" type="datetime1">
               <a:rPr kumimoji="0" lang="en-US" smtClean="0"/>
               <a:pPr/>
-              <a:t>3/4/2015</a:t>
+              <a:t>3/5/2015</a:t>
             </a:fld>
             <a:endParaRPr kumimoji="0" lang="en-US"/>
           </a:p>
@@ -3275,7 +3274,7 @@
             <a:fld id="{E4606EA6-EFEA-4C30-9264-4F9291A5780D}" type="datetime1">
               <a:rPr kumimoji="0" lang="en-US" smtClean="0"/>
               <a:pPr/>
-              <a:t>3/4/2015</a:t>
+              <a:t>3/5/2015</a:t>
             </a:fld>
             <a:endParaRPr kumimoji="0" lang="en-US" sz="1400" dirty="0">
               <a:solidFill>
@@ -5071,15 +5070,7 @@
           <a:p>
             <a:r>
               <a:rPr lang="en-US" sz="3800" dirty="0" smtClean="0"/>
-              <a:t>Uses MVC architectural </a:t>
-            </a:r>
-            <a:r>
-              <a:rPr lang="en-US" sz="3800" dirty="0" smtClean="0"/>
-              <a:t>pattern</a:t>
-            </a:r>
-            <a:r>
-              <a:rPr lang="en-US" sz="3800" dirty="0" smtClean="0"/>
-              <a:t>:</a:t>
+              <a:t>Uses MVC architectural pattern:</a:t>
             </a:r>
           </a:p>
           <a:p>
@@ -5209,6 +5200,13 @@
   <p:clrMapOvr>
     <a:masterClrMapping/>
   </p:clrMapOvr>
+  <p:timing>
+    <p:tnLst>
+      <p:par>
+        <p:cTn id="1" dur="indefinite" restart="never" nodeType="tmRoot"/>
+      </p:par>
+    </p:tnLst>
+  </p:timing>
 </p:sld>
 </file>
 
@@ -5275,6 +5273,10 @@
               <a:rPr lang="en-US" dirty="0" err="1" smtClean="0"/>
               <a:t>HaaS</a:t>
             </a:r>
+            <a:r>
+              <a:rPr lang="en-US" dirty="0" smtClean="0"/>
+              <a:t> (~7 hours)</a:t>
+            </a:r>
             <a:endParaRPr lang="en-US" dirty="0" smtClean="0"/>
           </a:p>
           <a:p>
@@ -5286,13 +5288,22 @@
               <a:rPr lang="en-US" dirty="0" err="1" smtClean="0"/>
               <a:t>django</a:t>
             </a:r>
+            <a:r>
+              <a:rPr lang="en-US" dirty="0" smtClean="0"/>
+              <a:t> (~5 hours)</a:t>
+            </a:r>
             <a:endParaRPr lang="en-US" dirty="0" smtClean="0"/>
           </a:p>
           <a:p>
             <a:r>
               <a:rPr lang="en-US" dirty="0" smtClean="0"/>
-              <a:t>Designed UI</a:t>
-            </a:r>
+              <a:t>Designed </a:t>
+            </a:r>
+            <a:r>
+              <a:rPr lang="en-US" dirty="0" smtClean="0"/>
+              <a:t>UI and Templates (~4 hours)</a:t>
+            </a:r>
+            <a:endParaRPr lang="en-US" dirty="0" smtClean="0"/>
           </a:p>
           <a:p>
             <a:r>
@@ -5305,8 +5316,21 @@
             </a:r>
             <a:r>
               <a:rPr lang="en-US" dirty="0" smtClean="0"/>
-              <a:t> integration</a:t>
-            </a:r>
+              <a:t> </a:t>
+            </a:r>
+            <a:r>
+              <a:rPr lang="en-US" dirty="0" smtClean="0"/>
+              <a:t>integration </a:t>
+            </a:r>
+            <a:r>
+              <a:rPr lang="en-US" smtClean="0"/>
+              <a:t>(~12 </a:t>
+            </a:r>
+            <a:r>
+              <a:rPr lang="en-US" dirty="0" smtClean="0"/>
+              <a:t>hours)</a:t>
+            </a:r>
+            <a:endParaRPr lang="en-US" dirty="0" smtClean="0"/>
           </a:p>
           <a:p>
             <a:r>
@@ -5329,6 +5353,13 @@
   <p:clrMapOvr>
     <a:masterClrMapping/>
   </p:clrMapOvr>
+  <p:timing>
+    <p:tnLst>
+      <p:par>
+        <p:cTn id="1" dur="indefinite" restart="never" nodeType="tmRoot"/>
+      </p:par>
+    </p:tnLst>
+  </p:timing>
 </p:sld>
 </file>
 
@@ -5349,88 +5380,6 @@
           <a:chExt cx="0" cy="0"/>
         </a:xfrm>
       </p:grpSpPr>
-      <p:pic>
-        <p:nvPicPr>
-          <p:cNvPr id="20" name="Content Placeholder 19"/>
-          <p:cNvPicPr>
-            <a:picLocks noGrp="1" noChangeAspect="1"/>
-          </p:cNvPicPr>
-          <p:nvPr>
-            <p:ph sz="quarter" idx="13"/>
-          </p:nvPr>
-        </p:nvPicPr>
-        <p:blipFill>
-          <a:blip r:embed="rId2">
-            <a:extLst>
-              <a:ext uri="{28A0092B-C50C-407E-A947-70E740481C1C}">
-                <a14:useLocalDpi xmlns:a14="http://schemas.microsoft.com/office/drawing/2010/main" val="0"/>
-              </a:ext>
-            </a:extLst>
-          </a:blip>
-          <a:stretch>
-            <a:fillRect/>
-          </a:stretch>
-        </p:blipFill>
-        <p:spPr>
-          <a:xfrm>
-            <a:off x="304800" y="1428750"/>
-            <a:ext cx="8458200" cy="3581400"/>
-          </a:xfrm>
-        </p:spPr>
-      </p:pic>
-      <p:sp>
-        <p:nvSpPr>
-          <p:cNvPr id="21" name="Title 20"/>
-          <p:cNvSpPr>
-            <a:spLocks noGrp="1"/>
-          </p:cNvSpPr>
-          <p:nvPr>
-            <p:ph type="title"/>
-          </p:nvPr>
-        </p:nvSpPr>
-        <p:spPr/>
-        <p:txBody>
-          <a:bodyPr/>
-          <a:lstStyle/>
-          <a:p>
-            <a:r>
-              <a:rPr lang="en-US" dirty="0" smtClean="0"/>
-              <a:t>Sprint 1 – Cont’d</a:t>
-            </a:r>
-            <a:endParaRPr lang="en-US" dirty="0"/>
-          </a:p>
-        </p:txBody>
-      </p:sp>
-    </p:spTree>
-    <p:extLst>
-      <p:ext uri="{BB962C8B-B14F-4D97-AF65-F5344CB8AC3E}">
-        <p14:creationId xmlns:p14="http://schemas.microsoft.com/office/powerpoint/2010/main" val="2243242566"/>
-      </p:ext>
-    </p:extLst>
-  </p:cSld>
-  <p:clrMapOvr>
-    <a:masterClrMapping/>
-  </p:clrMapOvr>
-</p:sld>
-</file>
-
-<file path=ppt/slides/slide8.xml><?xml version="1.0" encoding="utf-8"?>
-<p:sld xmlns:a="http://schemas.openxmlformats.org/drawingml/2006/main" xmlns:r="http://schemas.openxmlformats.org/officeDocument/2006/relationships" xmlns:p="http://schemas.openxmlformats.org/presentationml/2006/main">
-  <p:cSld>
-    <p:spTree>
-      <p:nvGrpSpPr>
-        <p:cNvPr id="1" name=""/>
-        <p:cNvGrpSpPr/>
-        <p:nvPr/>
-      </p:nvGrpSpPr>
-      <p:grpSpPr>
-        <a:xfrm>
-          <a:off x="0" y="0"/>
-          <a:ext cx="0" cy="0"/>
-          <a:chOff x="0" y="0"/>
-          <a:chExt cx="0" cy="0"/>
-        </a:xfrm>
-      </p:grpSpPr>
       <p:sp>
         <p:nvSpPr>
           <p:cNvPr id="2" name="Title 1"/>
@@ -5517,10 +5466,17 @@
   <p:clrMapOvr>
     <a:masterClrMapping/>
   </p:clrMapOvr>
+  <p:timing>
+    <p:tnLst>
+      <p:par>
+        <p:cTn id="1" dur="indefinite" restart="never" nodeType="tmRoot"/>
+      </p:par>
+    </p:tnLst>
+  </p:timing>
 </p:sld>
 </file>
 
-<file path=ppt/slides/slide9.xml><?xml version="1.0" encoding="utf-8"?>
+<file path=ppt/slides/slide8.xml><?xml version="1.0" encoding="utf-8"?>
 <p:sld xmlns:a="http://schemas.openxmlformats.org/drawingml/2006/main" xmlns:r="http://schemas.openxmlformats.org/officeDocument/2006/relationships" xmlns:p="http://schemas.openxmlformats.org/presentationml/2006/main">
   <p:cSld>
     <p:spTree>

</xml_diff>